<commit_message>
using .emf instead of .svg bc of gradients
</commit_message>
<xml_diff>
--- a/docs/nodify_poster.pptx
+++ b/docs/nodify_poster.pptx
@@ -1,11 +1,11 @@
 
 <file path=ppt/presentation.xml><?xml version="1.0" encoding="utf-8"?>
-<p:presentation xmlns:a="http://schemas.openxmlformats.org/drawingml/2006/main" xmlns:r="http://schemas.openxmlformats.org/officeDocument/2006/relationships" xmlns:p="http://schemas.openxmlformats.org/presentationml/2006/main" saveSubsetFonts="1">
+<p:presentation xmlns:a="http://schemas.openxmlformats.org/drawingml/2006/main" xmlns:r="http://schemas.openxmlformats.org/officeDocument/2006/relationships" xmlns:p="http://schemas.openxmlformats.org/presentationml/2006/main" saveSubsetFonts="1" autoCompressPictures="0">
   <p:sldMasterIdLst>
     <p:sldMasterId id="2147483660" r:id="rId4"/>
   </p:sldMasterIdLst>
   <p:sldIdLst>
-    <p:sldId id="256" r:id="rId5"/>
+    <p:sldId id="258" r:id="rId5"/>
   </p:sldIdLst>
   <p:sldSz cx="43891200" cy="32918400"/>
   <p:notesSz cx="6858000" cy="9144000"/>
@@ -2947,7 +2947,13 @@
     </p:bg>
     <p:spTree>
       <p:nvGrpSpPr>
-        <p:cNvPr id="1" name=""/>
+        <p:cNvPr id="1" name="">
+          <a:extLst>
+            <a:ext uri="{FF2B5EF4-FFF2-40B4-BE49-F238E27FC236}">
+              <a16:creationId xmlns:a16="http://schemas.microsoft.com/office/drawing/2014/main" id="{AC960B07-3974-A764-68FC-8D4E3CCF7DBD}"/>
+            </a:ext>
+          </a:extLst>
+        </p:cNvPr>
         <p:cNvGrpSpPr/>
         <p:nvPr/>
       </p:nvGrpSpPr>
@@ -2964,7 +2970,7 @@
           <p:cNvPr id="7" name="Graphic 6">
             <a:extLst>
               <a:ext uri="{FF2B5EF4-FFF2-40B4-BE49-F238E27FC236}">
-                <a16:creationId xmlns:a16="http://schemas.microsoft.com/office/drawing/2014/main" id="{0DB8358B-82EB-943E-4E6A-731BB7E07720}"/>
+                <a16:creationId xmlns:a16="http://schemas.microsoft.com/office/drawing/2014/main" id="{ECDB39AA-6B1E-231B-094D-94CEF2AC2EC9}"/>
               </a:ext>
             </a:extLst>
           </p:cNvPr>
@@ -3000,7 +3006,7 @@
           <p:cNvPr id="2" name="Title 1">
             <a:extLst>
               <a:ext uri="{FF2B5EF4-FFF2-40B4-BE49-F238E27FC236}">
-                <a16:creationId xmlns:a16="http://schemas.microsoft.com/office/drawing/2014/main" id="{39E535C5-4231-460B-7E04-304BBB09BF80}"/>
+                <a16:creationId xmlns:a16="http://schemas.microsoft.com/office/drawing/2014/main" id="{E431190A-E39E-6361-3066-2AC608982669}"/>
               </a:ext>
             </a:extLst>
           </p:cNvPr>
@@ -3046,7 +3052,7 @@
           <p:cNvPr id="6" name="Picture 5" descr="A logo of a company&#10;&#10;AI-generated content may be incorrect.">
             <a:extLst>
               <a:ext uri="{FF2B5EF4-FFF2-40B4-BE49-F238E27FC236}">
-                <a16:creationId xmlns:a16="http://schemas.microsoft.com/office/drawing/2014/main" id="{D3148932-7F7B-5C10-B897-2A34D2CD12F3}"/>
+                <a16:creationId xmlns:a16="http://schemas.microsoft.com/office/drawing/2014/main" id="{983E2F97-C435-6526-650E-7DF064E58E3D}"/>
               </a:ext>
             </a:extLst>
           </p:cNvPr>
@@ -3082,7 +3088,7 @@
           <p:cNvPr id="15" name="TextBox 14">
             <a:extLst>
               <a:ext uri="{FF2B5EF4-FFF2-40B4-BE49-F238E27FC236}">
-                <a16:creationId xmlns:a16="http://schemas.microsoft.com/office/drawing/2014/main" id="{1E008F88-9412-D8AC-80FA-4D8BD0C6D4B4}"/>
+                <a16:creationId xmlns:a16="http://schemas.microsoft.com/office/drawing/2014/main" id="{64568365-8046-37F1-59FB-4458BB709ACD}"/>
               </a:ext>
             </a:extLst>
           </p:cNvPr>
@@ -3105,22 +3111,52 @@
           </a:bodyPr>
           <a:lstStyle/>
           <a:p>
-            <a:pPr algn="ctr"/>
-            <a:r>
-              <a:rPr lang="en-US" sz="6000" dirty="0">
+            <a:pPr marL="0" marR="0" lvl="0" indent="0" algn="ctr" defTabSz="457200" rtl="0" eaLnBrk="1" fontAlgn="auto" latinLnBrk="0" hangingPunct="1">
+              <a:lnSpc>
+                <a:spcPct val="100000"/>
+              </a:lnSpc>
+              <a:spcBef>
+                <a:spcPts val="0"/>
+              </a:spcBef>
+              <a:spcAft>
+                <a:spcPts val="0"/>
+              </a:spcAft>
+              <a:buClrTx/>
+              <a:buSzTx/>
+              <a:buFontTx/>
+              <a:buNone/>
+              <a:tabLst/>
+              <a:defRPr/>
+            </a:pPr>
+            <a:r>
+              <a:rPr kumimoji="0" lang="en-US" sz="6000" b="0" i="0" u="none" strike="noStrike" kern="1200" cap="none" spc="0" normalizeH="0" baseline="0" noProof="0" dirty="0">
+                <a:ln>
+                  <a:noFill/>
+                </a:ln>
                 <a:solidFill>
                   <a:srgbClr val="CDD6F4"/>
                 </a:solidFill>
+                <a:effectLst/>
+                <a:uLnTx/>
+                <a:uFillTx/>
                 <a:latin typeface="Biome" panose="020B0502040204020203" pitchFamily="34" charset="0"/>
+                <a:ea typeface="+mn-ea"/>
                 <a:cs typeface="Biome" panose="020B0502040204020203" pitchFamily="34" charset="0"/>
               </a:rPr>
               <a:t>Code visualization, made simple</a:t>
             </a:r>
-            <a:endParaRPr lang="en-CA" sz="6000" dirty="0">
+            <a:endParaRPr kumimoji="0" lang="en-CA" sz="6000" b="0" i="0" u="none" strike="noStrike" kern="1200" cap="none" spc="0" normalizeH="0" baseline="0" noProof="0" dirty="0">
+              <a:ln>
+                <a:noFill/>
+              </a:ln>
               <a:solidFill>
                 <a:srgbClr val="CDD6F4"/>
               </a:solidFill>
+              <a:effectLst/>
+              <a:uLnTx/>
+              <a:uFillTx/>
               <a:latin typeface="Biome" panose="020B0502040204020203" pitchFamily="34" charset="0"/>
+              <a:ea typeface="+mn-ea"/>
               <a:cs typeface="Biome" panose="020B0502040204020203" pitchFamily="34" charset="0"/>
             </a:endParaRPr>
           </a:p>
@@ -3131,7 +3167,7 @@
           <p:cNvPr id="24" name="Picture 23" descr="A black and white logo&#10;&#10;AI-generated content may be incorrect.">
             <a:extLst>
               <a:ext uri="{FF2B5EF4-FFF2-40B4-BE49-F238E27FC236}">
-                <a16:creationId xmlns:a16="http://schemas.microsoft.com/office/drawing/2014/main" id="{D653205C-4CE6-D366-23B1-0D25C23588F0}"/>
+                <a16:creationId xmlns:a16="http://schemas.microsoft.com/office/drawing/2014/main" id="{04B54E10-3AC8-83F7-0996-BE4AFD9E6D00}"/>
               </a:ext>
             </a:extLst>
           </p:cNvPr>
@@ -3174,7 +3210,7 @@
           <p:cNvPr id="26" name="Picture 25" descr="A white swirly symbol with flames&#10;&#10;AI-generated content may be incorrect.">
             <a:extLst>
               <a:ext uri="{FF2B5EF4-FFF2-40B4-BE49-F238E27FC236}">
-                <a16:creationId xmlns:a16="http://schemas.microsoft.com/office/drawing/2014/main" id="{D9540D25-B695-C061-D2BA-6F3D55AA6097}"/>
+                <a16:creationId xmlns:a16="http://schemas.microsoft.com/office/drawing/2014/main" id="{77CB3C37-23F2-416A-9233-7A1101F80DC1}"/>
               </a:ext>
             </a:extLst>
           </p:cNvPr>
@@ -3217,7 +3253,7 @@
           <p:cNvPr id="27" name="Rectangle: Diagonal Corners Rounded 26">
             <a:extLst>
               <a:ext uri="{FF2B5EF4-FFF2-40B4-BE49-F238E27FC236}">
-                <a16:creationId xmlns:a16="http://schemas.microsoft.com/office/drawing/2014/main" id="{263597A2-0A36-330A-497E-F6E1970A4DDB}"/>
+                <a16:creationId xmlns:a16="http://schemas.microsoft.com/office/drawing/2014/main" id="{EA31E43B-7D1D-30F0-82F9-0036C0DD7268}"/>
               </a:ext>
             </a:extLst>
           </p:cNvPr>
@@ -3267,55 +3303,135 @@
           <a:bodyPr rtlCol="0" anchor="ctr"/>
           <a:lstStyle/>
           <a:p>
-            <a:pPr algn="ctr"/>
-            <a:r>
-              <a:rPr lang="en-US" sz="4400" dirty="0">
+            <a:pPr marL="0" marR="0" lvl="0" indent="0" algn="ctr" defTabSz="457200" rtl="0" eaLnBrk="1" fontAlgn="auto" latinLnBrk="0" hangingPunct="1">
+              <a:lnSpc>
+                <a:spcPct val="100000"/>
+              </a:lnSpc>
+              <a:spcBef>
+                <a:spcPts val="0"/>
+              </a:spcBef>
+              <a:spcAft>
+                <a:spcPts val="0"/>
+              </a:spcAft>
+              <a:buClrTx/>
+              <a:buSzTx/>
+              <a:buFontTx/>
+              <a:buNone/>
+              <a:tabLst/>
+              <a:defRPr/>
+            </a:pPr>
+            <a:r>
+              <a:rPr kumimoji="0" lang="en-US" sz="4400" b="0" i="0" u="none" strike="noStrike" kern="1200" cap="none" spc="0" normalizeH="0" baseline="0" noProof="0" dirty="0">
+                <a:ln>
+                  <a:noFill/>
+                </a:ln>
                 <a:solidFill>
                   <a:srgbClr val="CDD6F4"/>
                 </a:solidFill>
+                <a:effectLst/>
+                <a:uLnTx/>
+                <a:uFillTx/>
                 <a:latin typeface="OCR A Extended" panose="02010509020102010303" pitchFamily="50" charset="0"/>
+                <a:ea typeface="+mn-ea"/>
+                <a:cs typeface="+mn-cs"/>
               </a:rPr>
               <a:t>No documentation?</a:t>
             </a:r>
           </a:p>
           <a:p>
-            <a:pPr algn="ctr"/>
-            <a:r>
-              <a:rPr lang="en-US" sz="4400" dirty="0">
+            <a:pPr marL="0" marR="0" lvl="0" indent="0" algn="ctr" defTabSz="457200" rtl="0" eaLnBrk="1" fontAlgn="auto" latinLnBrk="0" hangingPunct="1">
+              <a:lnSpc>
+                <a:spcPct val="100000"/>
+              </a:lnSpc>
+              <a:spcBef>
+                <a:spcPts val="0"/>
+              </a:spcBef>
+              <a:spcAft>
+                <a:spcPts val="0"/>
+              </a:spcAft>
+              <a:buClrTx/>
+              <a:buSzTx/>
+              <a:buFontTx/>
+              <a:buNone/>
+              <a:tabLst/>
+              <a:defRPr/>
+            </a:pPr>
+            <a:r>
+              <a:rPr kumimoji="0" lang="en-US" sz="4400" b="0" i="0" u="none" strike="noStrike" kern="1200" cap="none" spc="0" normalizeH="0" baseline="0" noProof="0" dirty="0">
+                <a:ln>
+                  <a:noFill/>
+                </a:ln>
                 <a:solidFill>
                   <a:srgbClr val="CDD6F4"/>
                 </a:solidFill>
+                <a:effectLst/>
+                <a:uLnTx/>
+                <a:uFillTx/>
                 <a:latin typeface="OCR A Extended" panose="02010509020102010303" pitchFamily="50" charset="0"/>
+                <a:ea typeface="+mn-ea"/>
+                <a:cs typeface="+mn-cs"/>
               </a:rPr>
               <a:t>No direction?</a:t>
             </a:r>
           </a:p>
           <a:p>
-            <a:pPr algn="ctr"/>
-            <a:r>
-              <a:rPr lang="en-US" sz="4400" dirty="0">
+            <a:pPr marL="0" marR="0" lvl="0" indent="0" algn="ctr" defTabSz="457200" rtl="0" eaLnBrk="1" fontAlgn="auto" latinLnBrk="0" hangingPunct="1">
+              <a:lnSpc>
+                <a:spcPct val="100000"/>
+              </a:lnSpc>
+              <a:spcBef>
+                <a:spcPts val="0"/>
+              </a:spcBef>
+              <a:spcAft>
+                <a:spcPts val="0"/>
+              </a:spcAft>
+              <a:buClrTx/>
+              <a:buSzTx/>
+              <a:buFontTx/>
+              <a:buNone/>
+              <a:tabLst/>
+              <a:defRPr/>
+            </a:pPr>
+            <a:r>
+              <a:rPr kumimoji="0" lang="en-US" sz="4400" b="0" i="0" u="none" strike="noStrike" kern="1200" cap="none" spc="0" normalizeH="0" baseline="0" noProof="0" dirty="0">
+                <a:ln>
+                  <a:noFill/>
+                </a:ln>
                 <a:solidFill>
                   <a:srgbClr val="CDD6F4"/>
                 </a:solidFill>
+                <a:effectLst/>
+                <a:uLnTx/>
+                <a:uFillTx/>
                 <a:latin typeface="OCR A Extended" panose="02010509020102010303" pitchFamily="50" charset="0"/>
+                <a:ea typeface="+mn-ea"/>
+                <a:cs typeface="+mn-cs"/>
               </a:rPr>
               <a:t>No problem.</a:t>
             </a:r>
-            <a:endParaRPr lang="en-CA" sz="4400" dirty="0">
+            <a:endParaRPr kumimoji="0" lang="en-CA" sz="4400" b="0" i="0" u="none" strike="noStrike" kern="1200" cap="none" spc="0" normalizeH="0" baseline="0" noProof="0" dirty="0">
+              <a:ln>
+                <a:noFill/>
+              </a:ln>
               <a:solidFill>
                 <a:srgbClr val="CDD6F4"/>
               </a:solidFill>
+              <a:effectLst/>
+              <a:uLnTx/>
+              <a:uFillTx/>
               <a:latin typeface="OCR A Extended" panose="02010509020102010303" pitchFamily="50" charset="0"/>
+              <a:ea typeface="+mn-ea"/>
+              <a:cs typeface="+mn-cs"/>
             </a:endParaRPr>
           </a:p>
         </p:txBody>
       </p:sp>
       <p:pic>
         <p:nvPicPr>
-          <p:cNvPr id="10" name="Graphic 9">
+          <p:cNvPr id="4" name="Picture 3">
             <a:extLst>
               <a:ext uri="{FF2B5EF4-FFF2-40B4-BE49-F238E27FC236}">
-                <a16:creationId xmlns:a16="http://schemas.microsoft.com/office/drawing/2014/main" id="{3307962A-3599-1ABC-04C5-FA9D23C8A2C7}"/>
+                <a16:creationId xmlns:a16="http://schemas.microsoft.com/office/drawing/2014/main" id="{EB89C64D-B441-6188-58DA-1DE5CBDABFC6}"/>
               </a:ext>
             </a:extLst>
           </p:cNvPr>
@@ -3325,31 +3441,58 @@
           <p:nvPr/>
         </p:nvPicPr>
         <p:blipFill>
-          <a:blip r:embed="rId7">
-            <a:extLst>
-              <a:ext uri="{96DAC541-7B7A-43D3-8B79-37D633B846F1}">
-                <asvg:svgBlip xmlns:asvg="http://schemas.microsoft.com/office/drawing/2016/SVG/main" r:embed="rId8"/>
-              </a:ext>
-            </a:extLst>
-          </a:blip>
+          <a:blip r:embed="rId7"/>
           <a:stretch>
             <a:fillRect/>
           </a:stretch>
         </p:blipFill>
         <p:spPr>
           <a:xfrm>
-            <a:off x="438611" y="5528500"/>
-            <a:ext cx="42922211" cy="27088773"/>
+            <a:off x="438609" y="5538123"/>
+            <a:ext cx="43013981" cy="27138345"/>
           </a:xfrm>
           <a:prstGeom prst="rect">
             <a:avLst/>
           </a:prstGeom>
         </p:spPr>
       </p:pic>
+      <p:pic>
+        <p:nvPicPr>
+          <p:cNvPr id="13" name="Picture 12" descr="A blue ribbon with a cross&#10;&#10;AI-generated content may be incorrect.">
+            <a:extLst>
+              <a:ext uri="{FF2B5EF4-FFF2-40B4-BE49-F238E27FC236}">
+                <a16:creationId xmlns:a16="http://schemas.microsoft.com/office/drawing/2014/main" id="{41B8367F-A5F9-FE03-9E41-BF22784640AB}"/>
+              </a:ext>
+            </a:extLst>
+          </p:cNvPr>
+          <p:cNvPicPr>
+            <a:picLocks noChangeAspect="1"/>
+          </p:cNvPicPr>
+          <p:nvPr/>
+        </p:nvPicPr>
+        <p:blipFill>
+          <a:blip r:embed="rId8"/>
+          <a:stretch>
+            <a:fillRect/>
+          </a:stretch>
+        </p:blipFill>
+        <p:spPr>
+          <a:xfrm>
+            <a:off x="26628726" y="27970692"/>
+            <a:ext cx="1819274" cy="1819274"/>
+          </a:xfrm>
+          <a:prstGeom prst="rect">
+            <a:avLst/>
+          </a:prstGeom>
+          <a:solidFill>
+            <a:srgbClr val="313244"/>
+          </a:solidFill>
+        </p:spPr>
+      </p:pic>
     </p:spTree>
     <p:extLst>
       <p:ext uri="{BB962C8B-B14F-4D97-AF65-F5344CB8AC3E}">
-        <p14:creationId xmlns:p14="http://schemas.microsoft.com/office/powerpoint/2010/main" val="1856427165"/>
+        <p14:creationId xmlns:p14="http://schemas.microsoft.com/office/powerpoint/2010/main" val="595193949"/>
       </p:ext>
     </p:extLst>
   </p:cSld>
@@ -3675,23 +3818,6 @@
 </file>
 
 <file path=customXml/item1.xml><?xml version="1.0" encoding="utf-8"?>
-<?mso-contentType ?>
-<FormTemplates xmlns="http://schemas.microsoft.com/sharepoint/v3/contenttype/forms">
-  <Display>DocumentLibraryForm</Display>
-  <Edit>DocumentLibraryForm</Edit>
-  <New>DocumentLibraryForm</New>
-</FormTemplates>
-</file>
-
-<file path=customXml/item2.xml><?xml version="1.0" encoding="utf-8"?>
-<p:properties xmlns:p="http://schemas.microsoft.com/office/2006/metadata/properties" xmlns:xsi="http://www.w3.org/2001/XMLSchema-instance" xmlns:pc="http://schemas.microsoft.com/office/infopath/2007/PartnerControls">
-  <documentManagement>
-    <_activity xmlns="9dd4c7c4-1415-43cf-88fe-918223ddba8d" xsi:nil="true"/>
-  </documentManagement>
-</p:properties>
-</file>
-
-<file path=customXml/item3.xml><?xml version="1.0" encoding="utf-8"?>
 <ct:contentTypeSchema xmlns:ct="http://schemas.microsoft.com/office/2006/metadata/contentType" xmlns:ma="http://schemas.microsoft.com/office/2006/metadata/properties/metaAttributes" ct:_="" ma:_="" ma:contentTypeName="Document" ma:contentTypeID="0x010100D0E6BC6AB13D734ABB206E2514E0B0BE" ma:contentTypeVersion="18" ma:contentTypeDescription="Create a new document." ma:contentTypeScope="" ma:versionID="a23ea4f791e8c12f1f17b21b7be66e51">
   <xsd:schema xmlns:xsd="http://www.w3.org/2001/XMLSchema" xmlns:xs="http://www.w3.org/2001/XMLSchema" xmlns:p="http://schemas.microsoft.com/office/2006/metadata/properties" xmlns:ns3="9dd4c7c4-1415-43cf-88fe-918223ddba8d" xmlns:ns4="b29808ab-c9ee-4119-ab89-34c9507d6fa0" targetNamespace="http://schemas.microsoft.com/office/2006/metadata/properties" ma:root="true" ma:fieldsID="7c2acf41e182827a288184e2c12f3f6d" ns3:_="" ns4:_="">
     <xsd:import namespace="9dd4c7c4-1415-43cf-88fe-918223ddba8d"/>
@@ -3944,32 +4070,24 @@
 </ct:contentTypeSchema>
 </file>
 
-<file path=customXml/itemProps1.xml><?xml version="1.0" encoding="utf-8"?>
-<ds:datastoreItem xmlns:ds="http://schemas.openxmlformats.org/officeDocument/2006/customXml" ds:itemID="{3237D332-8CC4-429B-98C9-B395E35DF91D}">
-  <ds:schemaRefs>
-    <ds:schemaRef ds:uri="http://schemas.microsoft.com/sharepoint/v3/contenttype/forms"/>
-  </ds:schemaRefs>
-</ds:datastoreItem>
+<file path=customXml/item2.xml><?xml version="1.0" encoding="utf-8"?>
+<p:properties xmlns:p="http://schemas.microsoft.com/office/2006/metadata/properties" xmlns:xsi="http://www.w3.org/2001/XMLSchema-instance" xmlns:pc="http://schemas.microsoft.com/office/infopath/2007/PartnerControls">
+  <documentManagement>
+    <_activity xmlns="9dd4c7c4-1415-43cf-88fe-918223ddba8d" xsi:nil="true"/>
+  </documentManagement>
+</p:properties>
 </file>
 
-<file path=customXml/itemProps2.xml><?xml version="1.0" encoding="utf-8"?>
-<ds:datastoreItem xmlns:ds="http://schemas.openxmlformats.org/officeDocument/2006/customXml" ds:itemID="{C5F16F39-EB5A-437B-928E-EE838064BD31}">
-  <ds:schemaRefs>
-    <ds:schemaRef ds:uri="http://schemas.microsoft.com/office/2006/documentManagement/types"/>
-    <ds:schemaRef ds:uri="http://purl.org/dc/terms/"/>
-    <ds:schemaRef ds:uri="9dd4c7c4-1415-43cf-88fe-918223ddba8d"/>
-    <ds:schemaRef ds:uri="http://schemas.microsoft.com/office/2006/metadata/properties"/>
-    <ds:schemaRef ds:uri="http://purl.org/dc/dcmitype/"/>
-    <ds:schemaRef ds:uri="http://purl.org/dc/elements/1.1/"/>
-    <ds:schemaRef ds:uri="http://schemas.microsoft.com/office/infopath/2007/PartnerControls"/>
-    <ds:schemaRef ds:uri="http://schemas.openxmlformats.org/package/2006/metadata/core-properties"/>
-    <ds:schemaRef ds:uri="b29808ab-c9ee-4119-ab89-34c9507d6fa0"/>
-    <ds:schemaRef ds:uri="http://www.w3.org/XML/1998/namespace"/>
-  </ds:schemaRefs>
-</ds:datastoreItem>
+<file path=customXml/item3.xml><?xml version="1.0" encoding="utf-8"?>
+<?mso-contentType ?>
+<FormTemplates xmlns="http://schemas.microsoft.com/sharepoint/v3/contenttype/forms">
+  <Display>DocumentLibraryForm</Display>
+  <Edit>DocumentLibraryForm</Edit>
+  <New>DocumentLibraryForm</New>
+</FormTemplates>
 </file>
 
-<file path=customXml/itemProps3.xml><?xml version="1.0" encoding="utf-8"?>
+<file path=customXml/itemProps1.xml><?xml version="1.0" encoding="utf-8"?>
 <ds:datastoreItem xmlns:ds="http://schemas.openxmlformats.org/officeDocument/2006/customXml" ds:itemID="{40C22390-BB41-456C-BB60-04F39E1C4D6B}">
   <ds:schemaRefs>
     <ds:schemaRef ds:uri="9dd4c7c4-1415-43cf-88fe-918223ddba8d"/>
@@ -3986,4 +4104,29 @@
     <ds:schemaRef ds:uri="http://www.w3.org/2001/XMLSchema"/>
   </ds:schemaRefs>
 </ds:datastoreItem>
+</file>
+
+<file path=customXml/itemProps2.xml><?xml version="1.0" encoding="utf-8"?>
+<ds:datastoreItem xmlns:ds="http://schemas.openxmlformats.org/officeDocument/2006/customXml" ds:itemID="{C5F16F39-EB5A-437B-928E-EE838064BD31}">
+  <ds:schemaRefs>
+    <ds:schemaRef ds:uri="http://purl.org/dc/elements/1.1/"/>
+    <ds:schemaRef ds:uri="http://schemas.openxmlformats.org/package/2006/metadata/core-properties"/>
+    <ds:schemaRef ds:uri="http://schemas.microsoft.com/office/2006/documentManagement/types"/>
+    <ds:schemaRef ds:uri="http://schemas.microsoft.com/office/infopath/2007/PartnerControls"/>
+    <ds:schemaRef ds:uri="b29808ab-c9ee-4119-ab89-34c9507d6fa0"/>
+    <ds:schemaRef ds:uri="9dd4c7c4-1415-43cf-88fe-918223ddba8d"/>
+    <ds:schemaRef ds:uri="http://schemas.microsoft.com/office/2006/metadata/properties"/>
+    <ds:schemaRef ds:uri="http://www.w3.org/XML/1998/namespace"/>
+    <ds:schemaRef ds:uri="http://purl.org/dc/dcmitype/"/>
+    <ds:schemaRef ds:uri="http://purl.org/dc/terms/"/>
+  </ds:schemaRefs>
+</ds:datastoreItem>
+</file>
+
+<file path=customXml/itemProps3.xml><?xml version="1.0" encoding="utf-8"?>
+<ds:datastoreItem xmlns:ds="http://schemas.openxmlformats.org/officeDocument/2006/customXml" ds:itemID="{3237D332-8CC4-429B-98C9-B395E35DF91D}">
+  <ds:schemaRefs>
+    <ds:schemaRef ds:uri="http://schemas.microsoft.com/sharepoint/v3/contenttype/forms"/>
+  </ds:schemaRefs>
+</ds:datastoreItem>
 </file>
</xml_diff>